<commit_message>
add video 005 and 006
</commit_message>
<xml_diff>
--- a/use_protege/Using_Protege.pptx
+++ b/use_protege/Using_Protege.pptx
@@ -42367,8 +42367,25 @@
                   </a:schemeClr>
                 </a:solidFill>
               </a:rPr>
-              <a:t> – Ontology Development 101</a:t>
+              <a:t> – Ontology Development 101 – Steps for </a:t>
             </a:r>
+            <a:r>
+              <a:rPr lang="en-US" sz="3600" b="1">
+                <a:solidFill>
+                  <a:schemeClr val="tx1">
+                    <a:lumMod val="75000"/>
+                  </a:schemeClr>
+                </a:solidFill>
+              </a:rPr>
+              <a:t>Making Ontology</a:t>
+            </a:r>
+            <a:endParaRPr lang="en-US" sz="3600" b="1" dirty="0">
+              <a:solidFill>
+                <a:schemeClr val="tx1">
+                  <a:lumMod val="75000"/>
+                </a:schemeClr>
+              </a:solidFill>
+            </a:endParaRPr>
           </a:p>
         </p:txBody>
       </p:sp>

</xml_diff>

<commit_message>
update 001 002 cover image
</commit_message>
<xml_diff>
--- a/use_protege/Using_Protege.pptx
+++ b/use_protege/Using_Protege.pptx
@@ -258,7 +258,7 @@
           <a:p>
             <a:fld id="{FD913024-4032-4B4F-8680-09D5E08EDB6E}" type="datetimeFigureOut">
               <a:rPr lang="en-US" smtClean="0"/>
-              <a:t>1/28/2024</a:t>
+              <a:t>1/30/2024</a:t>
             </a:fld>
             <a:endParaRPr lang="en-US" dirty="0"/>
           </a:p>
@@ -435,7 +435,7 @@
           <a:p>
             <a:fld id="{F2AE225E-43E0-7047-8ADB-DD9EBB41B4D0}" type="datetimeFigureOut">
               <a:rPr lang="en-US" noProof="0" smtClean="0"/>
-              <a:t>1/28/2024</a:t>
+              <a:t>1/30/2024</a:t>
             </a:fld>
             <a:endParaRPr lang="en-US" noProof="0" dirty="0"/>
           </a:p>
@@ -40243,8 +40243,8 @@
         </p:nvSpPr>
         <p:spPr>
           <a:xfrm>
-            <a:off x="614897" y="928462"/>
-            <a:ext cx="5723150" cy="1441863"/>
+            <a:off x="614896" y="928462"/>
+            <a:ext cx="6924421" cy="2395826"/>
           </a:xfrm>
         </p:spPr>
         <p:txBody>
@@ -40253,8 +40253,15 @@
           <a:p>
             <a:pPr algn="l"/>
             <a:r>
+              <a:rPr lang="en-US" sz="6600" b="1" dirty="0"/>
+              <a:t>Using Protégé</a:t>
+            </a:r>
+            <a:br>
+              <a:rPr lang="en-US" sz="6600" b="1" dirty="0"/>
+            </a:br>
+            <a:r>
               <a:rPr lang="en-US" sz="4800" b="1" dirty="0"/>
-              <a:t>Using Protégé – the ontology editor</a:t>
+              <a:t>– the ontology editor</a:t>
             </a:r>
           </a:p>
         </p:txBody>
@@ -40358,8 +40365,8 @@
         </p:blipFill>
         <p:spPr>
           <a:xfrm>
-            <a:off x="6822141" y="894697"/>
-            <a:ext cx="4754962" cy="5414682"/>
+            <a:off x="7642433" y="1828799"/>
+            <a:ext cx="3934669" cy="4480579"/>
           </a:xfrm>
           <a:prstGeom prst="rect">
             <a:avLst/>
@@ -40793,7 +40800,7 @@
         <p:spPr>
           <a:xfrm>
             <a:off x="614897" y="928462"/>
-            <a:ext cx="5723150" cy="1441863"/>
+            <a:ext cx="6305856" cy="1847652"/>
           </a:xfrm>
         </p:spPr>
         <p:txBody>
@@ -40802,8 +40809,15 @@
           <a:p>
             <a:pPr algn="l"/>
             <a:r>
+              <a:rPr lang="en-US" sz="6600" b="1" dirty="0"/>
+              <a:t>Using Protégé</a:t>
+            </a:r>
+            <a:br>
               <a:rPr lang="en-US" sz="4800" b="1" dirty="0"/>
-              <a:t>Using Protégé – the ontology editor</a:t>
+            </a:br>
+            <a:r>
+              <a:rPr lang="en-US" sz="4800" b="1" dirty="0"/>
+              <a:t>– the ontology editor</a:t>
             </a:r>
           </a:p>
         </p:txBody>
@@ -41150,8 +41164,8 @@
         </p:blipFill>
         <p:spPr>
           <a:xfrm>
-            <a:off x="6338047" y="1408894"/>
-            <a:ext cx="5548872" cy="4040212"/>
+            <a:off x="7037873" y="1918446"/>
+            <a:ext cx="4849046" cy="3530659"/>
           </a:xfrm>
           <a:prstGeom prst="rect">
             <a:avLst/>
@@ -43698,26 +43712,6 @@
 </file>
 
 <file path=customXml/item2.xml><?xml version="1.0" encoding="utf-8"?>
-<p:properties xmlns:p="http://schemas.microsoft.com/office/2006/metadata/properties" xmlns:xsi="http://www.w3.org/2001/XMLSchema-instance" xmlns:pc="http://schemas.microsoft.com/office/infopath/2007/PartnerControls">
-  <documentManagement>
-    <_ip_UnifiedCompliancePolicyUIAction xmlns="http://schemas.microsoft.com/sharepoint/v3" xsi:nil="true"/>
-    <Image xmlns="71af3243-3dd4-4a8d-8c0d-dd76da1f02a5">
-      <Url xsi:nil="true"/>
-      <Description xsi:nil="true"/>
-    </Image>
-    <Status xmlns="71af3243-3dd4-4a8d-8c0d-dd76da1f02a5">Not started</Status>
-    <Background xmlns="71af3243-3dd4-4a8d-8c0d-dd76da1f02a5">false</Background>
-    <_ip_UnifiedCompliancePolicyProperties xmlns="http://schemas.microsoft.com/sharepoint/v3" xsi:nil="true"/>
-    <ImageTagsTaxHTField xmlns="71af3243-3dd4-4a8d-8c0d-dd76da1f02a5">
-      <Terms xmlns="http://schemas.microsoft.com/office/infopath/2007/PartnerControls"/>
-    </ImageTagsTaxHTField>
-    <TaxCatchAll xmlns="230e9df3-be65-4c73-a93b-d1236ebd677e" xsi:nil="true"/>
-    <MediaServiceKeyPoints xmlns="71af3243-3dd4-4a8d-8c0d-dd76da1f02a5" xsi:nil="true"/>
-  </documentManagement>
-</p:properties>
-</file>
-
-<file path=customXml/item3.xml><?xml version="1.0" encoding="utf-8"?>
 <ct:contentTypeSchema xmlns:ct="http://schemas.microsoft.com/office/2006/metadata/contentType" xmlns:ma="http://schemas.microsoft.com/office/2006/metadata/properties/metaAttributes" ct:_="" ma:_="" ma:contentTypeName="Document" ma:contentTypeID="0x01010079F111ED35F8CC479449609E8A0923A6" ma:contentTypeVersion="28" ma:contentTypeDescription="Create a new document." ma:contentTypeScope="" ma:versionID="60f5a4f2d2b0abadcf532d48ebf9cb71">
   <xsd:schema xmlns:xsd="http://www.w3.org/2001/XMLSchema" xmlns:xs="http://www.w3.org/2001/XMLSchema" xmlns:p="http://schemas.microsoft.com/office/2006/metadata/properties" xmlns:ns1="http://schemas.microsoft.com/sharepoint/v3" xmlns:ns2="71af3243-3dd4-4a8d-8c0d-dd76da1f02a5" xmlns:ns3="16c05727-aa75-4e4a-9b5f-8a80a1165891" xmlns:ns4="230e9df3-be65-4c73-a93b-d1236ebd677e" targetNamespace="http://schemas.microsoft.com/office/2006/metadata/properties" ma:root="true" ma:fieldsID="7dd78129e6a1811f84807ad11c651531" ns1:_="" ns2:_="" ns3:_="" ns4:_="">
     <xsd:import namespace="http://schemas.microsoft.com/sharepoint/v3"/>
@@ -44029,6 +44023,26 @@
 </ct:contentTypeSchema>
 </file>
 
+<file path=customXml/item3.xml><?xml version="1.0" encoding="utf-8"?>
+<p:properties xmlns:p="http://schemas.microsoft.com/office/2006/metadata/properties" xmlns:xsi="http://www.w3.org/2001/XMLSchema-instance" xmlns:pc="http://schemas.microsoft.com/office/infopath/2007/PartnerControls">
+  <documentManagement>
+    <_ip_UnifiedCompliancePolicyUIAction xmlns="http://schemas.microsoft.com/sharepoint/v3" xsi:nil="true"/>
+    <Image xmlns="71af3243-3dd4-4a8d-8c0d-dd76da1f02a5">
+      <Url xsi:nil="true"/>
+      <Description xsi:nil="true"/>
+    </Image>
+    <Status xmlns="71af3243-3dd4-4a8d-8c0d-dd76da1f02a5">Not started</Status>
+    <Background xmlns="71af3243-3dd4-4a8d-8c0d-dd76da1f02a5">false</Background>
+    <_ip_UnifiedCompliancePolicyProperties xmlns="http://schemas.microsoft.com/sharepoint/v3" xsi:nil="true"/>
+    <ImageTagsTaxHTField xmlns="71af3243-3dd4-4a8d-8c0d-dd76da1f02a5">
+      <Terms xmlns="http://schemas.microsoft.com/office/infopath/2007/PartnerControls"/>
+    </ImageTagsTaxHTField>
+    <TaxCatchAll xmlns="230e9df3-be65-4c73-a93b-d1236ebd677e" xsi:nil="true"/>
+    <MediaServiceKeyPoints xmlns="71af3243-3dd4-4a8d-8c0d-dd76da1f02a5" xsi:nil="true"/>
+  </documentManagement>
+</p:properties>
+</file>
+
 <file path=customXml/itemProps1.xml><?xml version="1.0" encoding="utf-8"?>
 <ds:datastoreItem xmlns:ds="http://schemas.openxmlformats.org/officeDocument/2006/customXml" ds:itemID="{1EE26AC2-BC04-45BA-BD7C-5CDF09AA9426}">
   <ds:schemaRefs>
@@ -44038,18 +44052,6 @@
 </file>
 
 <file path=customXml/itemProps2.xml><?xml version="1.0" encoding="utf-8"?>
-<ds:datastoreItem xmlns:ds="http://schemas.openxmlformats.org/officeDocument/2006/customXml" ds:itemID="{C7AE7813-FB42-416C-BEF8-5F3180DDB0F6}">
-  <ds:schemaRefs>
-    <ds:schemaRef ds:uri="http://schemas.microsoft.com/office/2006/metadata/properties"/>
-    <ds:schemaRef ds:uri="http://schemas.microsoft.com/office/infopath/2007/PartnerControls"/>
-    <ds:schemaRef ds:uri="http://schemas.microsoft.com/sharepoint/v3"/>
-    <ds:schemaRef ds:uri="71af3243-3dd4-4a8d-8c0d-dd76da1f02a5"/>
-    <ds:schemaRef ds:uri="230e9df3-be65-4c73-a93b-d1236ebd677e"/>
-  </ds:schemaRefs>
-</ds:datastoreItem>
-</file>
-
-<file path=customXml/itemProps3.xml><?xml version="1.0" encoding="utf-8"?>
 <ds:datastoreItem xmlns:ds="http://schemas.openxmlformats.org/officeDocument/2006/customXml" ds:itemID="{18840F3C-8AB4-4243-A06A-B5999EF60028}">
   <ds:schemaRefs>
     <ds:schemaRef ds:uri="http://schemas.microsoft.com/office/2006/metadata/contentType"/>
@@ -44070,6 +44072,18 @@
 </ds:datastoreItem>
 </file>
 
+<file path=customXml/itemProps3.xml><?xml version="1.0" encoding="utf-8"?>
+<ds:datastoreItem xmlns:ds="http://schemas.openxmlformats.org/officeDocument/2006/customXml" ds:itemID="{C7AE7813-FB42-416C-BEF8-5F3180DDB0F6}">
+  <ds:schemaRefs>
+    <ds:schemaRef ds:uri="http://schemas.microsoft.com/office/2006/metadata/properties"/>
+    <ds:schemaRef ds:uri="http://schemas.microsoft.com/office/infopath/2007/PartnerControls"/>
+    <ds:schemaRef ds:uri="http://schemas.microsoft.com/sharepoint/v3"/>
+    <ds:schemaRef ds:uri="71af3243-3dd4-4a8d-8c0d-dd76da1f02a5"/>
+    <ds:schemaRef ds:uri="230e9df3-be65-4c73-a93b-d1236ebd677e"/>
+  </ds:schemaRefs>
+</ds:datastoreItem>
+</file>
+
 <file path=docMetadata/LabelInfo.xml><?xml version="1.0" encoding="utf-8"?>
 <clbl:labelList xmlns:clbl="http://schemas.microsoft.com/office/2020/mipLabelMetadata"/>
 </file>
</xml_diff>

<commit_message>
add Using Protege 007
</commit_message>
<xml_diff>
--- a/use_protege/Using_Protege.pptx
+++ b/use_protege/Using_Protege.pptx
@@ -5,10 +5,10 @@
     <p:sldMasterId id="2147483648" r:id="rId4"/>
   </p:sldMasterIdLst>
   <p:notesMasterIdLst>
-    <p:notesMasterId r:id="rId12"/>
+    <p:notesMasterId r:id="rId15"/>
   </p:notesMasterIdLst>
   <p:handoutMasterIdLst>
-    <p:handoutMasterId r:id="rId13"/>
+    <p:handoutMasterId r:id="rId16"/>
   </p:handoutMasterIdLst>
   <p:sldIdLst>
     <p:sldId id="272" r:id="rId5"/>
@@ -18,6 +18,9 @@
     <p:sldId id="276" r:id="rId9"/>
     <p:sldId id="277" r:id="rId10"/>
     <p:sldId id="278" r:id="rId11"/>
+    <p:sldId id="279" r:id="rId12"/>
+    <p:sldId id="280" r:id="rId13"/>
+    <p:sldId id="281" r:id="rId14"/>
   </p:sldIdLst>
   <p:sldSz cx="12192000" cy="6858000"/>
   <p:notesSz cx="6858000" cy="9144000"/>
@@ -258,7 +261,7 @@
           <a:p>
             <a:fld id="{FD913024-4032-4B4F-8680-09D5E08EDB6E}" type="datetimeFigureOut">
               <a:rPr lang="en-US" smtClean="0"/>
-              <a:t>1/30/2024</a:t>
+              <a:t>4/19/2024</a:t>
             </a:fld>
             <a:endParaRPr lang="en-US" dirty="0"/>
           </a:p>
@@ -435,7 +438,7 @@
           <a:p>
             <a:fld id="{F2AE225E-43E0-7047-8ADB-DD9EBB41B4D0}" type="datetimeFigureOut">
               <a:rPr lang="en-US" noProof="0" smtClean="0"/>
-              <a:t>1/30/2024</a:t>
+              <a:t>4/19/2024</a:t>
             </a:fld>
             <a:endParaRPr lang="en-US" noProof="0" dirty="0"/>
           </a:p>
@@ -40630,6 +40633,248 @@
     <p:extLst>
       <p:ext uri="{BB962C8B-B14F-4D97-AF65-F5344CB8AC3E}">
         <p14:creationId xmlns:p14="http://schemas.microsoft.com/office/powerpoint/2010/main" val="417536504"/>
+      </p:ext>
+    </p:extLst>
+  </p:cSld>
+  <p:clrMapOvr>
+    <a:masterClrMapping/>
+  </p:clrMapOvr>
+</p:sld>
+</file>
+
+<file path=ppt/slides/slide10.xml><?xml version="1.0" encoding="utf-8"?>
+<p:sld xmlns:a="http://schemas.openxmlformats.org/drawingml/2006/main" xmlns:r="http://schemas.openxmlformats.org/officeDocument/2006/relationships" xmlns:p="http://schemas.openxmlformats.org/presentationml/2006/main">
+  <p:cSld>
+    <p:spTree>
+      <p:nvGrpSpPr>
+        <p:cNvPr id="1" name=""/>
+        <p:cNvGrpSpPr/>
+        <p:nvPr/>
+      </p:nvGrpSpPr>
+      <p:grpSpPr>
+        <a:xfrm>
+          <a:off x="0" y="0"/>
+          <a:ext cx="0" cy="0"/>
+          <a:chOff x="0" y="0"/>
+          <a:chExt cx="0" cy="0"/>
+        </a:xfrm>
+      </p:grpSpPr>
+      <p:sp>
+        <p:nvSpPr>
+          <p:cNvPr id="2" name="Date Placeholder 1">
+            <a:extLst>
+              <a:ext uri="{FF2B5EF4-FFF2-40B4-BE49-F238E27FC236}">
+                <a16:creationId xmlns:a16="http://schemas.microsoft.com/office/drawing/2014/main" id="{1771C873-C03A-A903-2567-61483E435676}"/>
+              </a:ext>
+            </a:extLst>
+          </p:cNvPr>
+          <p:cNvSpPr>
+            <a:spLocks noGrp="1"/>
+          </p:cNvSpPr>
+          <p:nvPr>
+            <p:ph type="dt" sz="half" idx="10"/>
+          </p:nvPr>
+        </p:nvSpPr>
+        <p:spPr/>
+        <p:txBody>
+          <a:bodyPr/>
+          <a:lstStyle/>
+          <a:p>
+            <a:r>
+              <a:rPr lang="en-US"/>
+              <a:t>20XX</a:t>
+            </a:r>
+            <a:endParaRPr lang="en-US" dirty="0"/>
+          </a:p>
+        </p:txBody>
+      </p:sp>
+      <p:sp>
+        <p:nvSpPr>
+          <p:cNvPr id="3" name="Footer Placeholder 2">
+            <a:extLst>
+              <a:ext uri="{FF2B5EF4-FFF2-40B4-BE49-F238E27FC236}">
+                <a16:creationId xmlns:a16="http://schemas.microsoft.com/office/drawing/2014/main" id="{28E37011-F31F-271F-5E69-37F6E0A81DEF}"/>
+              </a:ext>
+            </a:extLst>
+          </p:cNvPr>
+          <p:cNvSpPr>
+            <a:spLocks noGrp="1"/>
+          </p:cNvSpPr>
+          <p:nvPr>
+            <p:ph type="ftr" sz="quarter" idx="11"/>
+          </p:nvPr>
+        </p:nvSpPr>
+        <p:spPr/>
+        <p:txBody>
+          <a:bodyPr/>
+          <a:lstStyle/>
+          <a:p>
+            <a:r>
+              <a:rPr lang="en-US"/>
+              <a:t>presentation title</a:t>
+            </a:r>
+            <a:endParaRPr lang="en-US" dirty="0"/>
+          </a:p>
+        </p:txBody>
+      </p:sp>
+      <p:sp>
+        <p:nvSpPr>
+          <p:cNvPr id="4" name="Slide Number Placeholder 3">
+            <a:extLst>
+              <a:ext uri="{FF2B5EF4-FFF2-40B4-BE49-F238E27FC236}">
+                <a16:creationId xmlns:a16="http://schemas.microsoft.com/office/drawing/2014/main" id="{FA2626A6-EC2F-6D6B-3562-5B590C626F10}"/>
+              </a:ext>
+            </a:extLst>
+          </p:cNvPr>
+          <p:cNvSpPr>
+            <a:spLocks noGrp="1"/>
+          </p:cNvSpPr>
+          <p:nvPr>
+            <p:ph type="sldNum" sz="quarter" idx="12"/>
+          </p:nvPr>
+        </p:nvSpPr>
+        <p:spPr/>
+        <p:txBody>
+          <a:bodyPr/>
+          <a:lstStyle/>
+          <a:p>
+            <a:fld id="{58FB4751-880F-D840-AAA9-3A15815CC996}" type="slidenum">
+              <a:rPr lang="en-US" smtClean="0"/>
+              <a:t>10</a:t>
+            </a:fld>
+            <a:endParaRPr lang="en-US" dirty="0"/>
+          </a:p>
+        </p:txBody>
+      </p:sp>
+      <p:sp>
+        <p:nvSpPr>
+          <p:cNvPr id="5" name="Title 4">
+            <a:extLst>
+              <a:ext uri="{FF2B5EF4-FFF2-40B4-BE49-F238E27FC236}">
+                <a16:creationId xmlns:a16="http://schemas.microsoft.com/office/drawing/2014/main" id="{09095531-EC48-4F01-5F54-87FB415AAE03}"/>
+              </a:ext>
+            </a:extLst>
+          </p:cNvPr>
+          <p:cNvSpPr>
+            <a:spLocks noGrp="1"/>
+          </p:cNvSpPr>
+          <p:nvPr>
+            <p:ph type="title"/>
+          </p:nvPr>
+        </p:nvSpPr>
+        <p:spPr/>
+        <p:txBody>
+          <a:bodyPr/>
+          <a:lstStyle/>
+          <a:p>
+            <a:r>
+              <a:rPr lang="en-US" dirty="0"/>
+              <a:t>Sample Ontology for Demo</a:t>
+            </a:r>
+          </a:p>
+        </p:txBody>
+      </p:sp>
+      <p:sp>
+        <p:nvSpPr>
+          <p:cNvPr id="6" name="Content Placeholder 5">
+            <a:extLst>
+              <a:ext uri="{FF2B5EF4-FFF2-40B4-BE49-F238E27FC236}">
+                <a16:creationId xmlns:a16="http://schemas.microsoft.com/office/drawing/2014/main" id="{E8980CDF-00B1-02C5-AA58-868C9F58E0F2}"/>
+              </a:ext>
+            </a:extLst>
+          </p:cNvPr>
+          <p:cNvSpPr>
+            <a:spLocks noGrp="1"/>
+          </p:cNvSpPr>
+          <p:nvPr>
+            <p:ph idx="1"/>
+          </p:nvPr>
+        </p:nvSpPr>
+        <p:spPr/>
+        <p:txBody>
+          <a:bodyPr/>
+          <a:lstStyle/>
+          <a:p>
+            <a:r>
+              <a:rPr lang="en-US" dirty="0"/>
+              <a:t>Class: A, B</a:t>
+            </a:r>
+          </a:p>
+          <a:p>
+            <a:r>
+              <a:rPr lang="en-US" dirty="0"/>
+              <a:t>Individual: A1, A2, A3, B1, B2, B3</a:t>
+            </a:r>
+          </a:p>
+          <a:p>
+            <a:r>
+              <a:rPr lang="en-US" dirty="0"/>
+              <a:t>Object Property: “Includes”, inverse of “</a:t>
+            </a:r>
+            <a:r>
+              <a:rPr lang="en-US" dirty="0" err="1"/>
+              <a:t>BelongsTo</a:t>
+            </a:r>
+            <a:r>
+              <a:rPr lang="en-US" dirty="0"/>
+              <a:t>”</a:t>
+            </a:r>
+          </a:p>
+          <a:p>
+            <a:r>
+              <a:rPr lang="en-US" dirty="0"/>
+              <a:t>Reasoner: Pellet</a:t>
+            </a:r>
+          </a:p>
+          <a:p>
+            <a:r>
+              <a:rPr lang="en-US" dirty="0"/>
+              <a:t>Asserted Relationship</a:t>
+            </a:r>
+          </a:p>
+          <a:p>
+            <a:pPr lvl="1"/>
+            <a:r>
+              <a:rPr lang="en-US" dirty="0"/>
+              <a:t>A1 – :Includes -&gt; B1</a:t>
+            </a:r>
+          </a:p>
+          <a:p>
+            <a:pPr lvl="1"/>
+            <a:r>
+              <a:rPr lang="en-US" dirty="0"/>
+              <a:t>A2 &lt;- :</a:t>
+            </a:r>
+            <a:r>
+              <a:rPr lang="en-US" dirty="0" err="1"/>
+              <a:t>BelongsTo</a:t>
+            </a:r>
+            <a:r>
+              <a:rPr lang="en-US" dirty="0"/>
+              <a:t> – B2</a:t>
+            </a:r>
+          </a:p>
+          <a:p>
+            <a:pPr lvl="1"/>
+            <a:r>
+              <a:rPr lang="en-US" dirty="0"/>
+              <a:t>A3 &lt;- :</a:t>
+            </a:r>
+            <a:r>
+              <a:rPr lang="en-US" dirty="0" err="1"/>
+              <a:t>BelongsTo</a:t>
+            </a:r>
+            <a:r>
+              <a:rPr lang="en-US" dirty="0"/>
+              <a:t> – B3</a:t>
+            </a:r>
+          </a:p>
+        </p:txBody>
+      </p:sp>
+    </p:spTree>
+    <p:extLst>
+      <p:ext uri="{BB962C8B-B14F-4D97-AF65-F5344CB8AC3E}">
+        <p14:creationId xmlns:p14="http://schemas.microsoft.com/office/powerpoint/2010/main" val="3851201387"/>
       </p:ext>
     </p:extLst>
   </p:cSld>
@@ -42911,6 +43156,959 @@
 </p:sld>
 </file>
 
+<file path=ppt/slides/slide8.xml><?xml version="1.0" encoding="utf-8"?>
+<p:sld xmlns:a="http://schemas.openxmlformats.org/drawingml/2006/main" xmlns:r="http://schemas.openxmlformats.org/officeDocument/2006/relationships" xmlns:p="http://schemas.openxmlformats.org/presentationml/2006/main">
+  <p:cSld>
+    <p:spTree>
+      <p:nvGrpSpPr>
+        <p:cNvPr id="1" name=""/>
+        <p:cNvGrpSpPr/>
+        <p:nvPr/>
+      </p:nvGrpSpPr>
+      <p:grpSpPr>
+        <a:xfrm>
+          <a:off x="0" y="0"/>
+          <a:ext cx="0" cy="0"/>
+          <a:chOff x="0" y="0"/>
+          <a:chExt cx="0" cy="0"/>
+        </a:xfrm>
+      </p:grpSpPr>
+      <p:sp>
+        <p:nvSpPr>
+          <p:cNvPr id="2" name="Title 1">
+            <a:extLst>
+              <a:ext uri="{FF2B5EF4-FFF2-40B4-BE49-F238E27FC236}">
+                <a16:creationId xmlns:a16="http://schemas.microsoft.com/office/drawing/2014/main" id="{43B8BB83-CA62-C813-5584-9F9C32557A2B}"/>
+              </a:ext>
+            </a:extLst>
+          </p:cNvPr>
+          <p:cNvSpPr>
+            <a:spLocks noGrp="1"/>
+          </p:cNvSpPr>
+          <p:nvPr>
+            <p:ph type="ctrTitle"/>
+          </p:nvPr>
+        </p:nvSpPr>
+        <p:spPr>
+          <a:xfrm>
+            <a:off x="614897" y="928462"/>
+            <a:ext cx="5723150" cy="1441863"/>
+          </a:xfrm>
+        </p:spPr>
+        <p:txBody>
+          <a:bodyPr/>
+          <a:lstStyle/>
+          <a:p>
+            <a:pPr algn="l"/>
+            <a:r>
+              <a:rPr lang="en-US" sz="4800" b="1" dirty="0"/>
+              <a:t>Using Protégé – the ontology editor</a:t>
+            </a:r>
+          </a:p>
+        </p:txBody>
+      </p:sp>
+      <p:sp>
+        <p:nvSpPr>
+          <p:cNvPr id="3" name="Subtitle 2">
+            <a:extLst>
+              <a:ext uri="{FF2B5EF4-FFF2-40B4-BE49-F238E27FC236}">
+                <a16:creationId xmlns:a16="http://schemas.microsoft.com/office/drawing/2014/main" id="{CA0D2251-7AFE-1B36-778C-D116EDBB7FDE}"/>
+              </a:ext>
+            </a:extLst>
+          </p:cNvPr>
+          <p:cNvSpPr>
+            <a:spLocks noGrp="1"/>
+          </p:cNvSpPr>
+          <p:nvPr>
+            <p:ph type="subTitle" idx="1"/>
+          </p:nvPr>
+        </p:nvSpPr>
+        <p:spPr>
+          <a:xfrm>
+            <a:off x="699247" y="5121118"/>
+            <a:ext cx="4885765" cy="369333"/>
+          </a:xfrm>
+        </p:spPr>
+        <p:txBody>
+          <a:bodyPr>
+            <a:normAutofit fontScale="92500" lnSpcReduction="10000"/>
+          </a:bodyPr>
+          <a:lstStyle/>
+          <a:p>
+            <a:pPr algn="l"/>
+            <a:r>
+              <a:rPr lang="en-US" dirty="0"/>
+              <a:t>Xiaoqi Zhao</a:t>
+            </a:r>
+          </a:p>
+        </p:txBody>
+      </p:sp>
+      <p:pic>
+        <p:nvPicPr>
+          <p:cNvPr id="5" name="Picture 4">
+            <a:extLst>
+              <a:ext uri="{FF2B5EF4-FFF2-40B4-BE49-F238E27FC236}">
+                <a16:creationId xmlns:a16="http://schemas.microsoft.com/office/drawing/2014/main" id="{4189F100-1143-A09B-6515-E9A6736CA11D}"/>
+              </a:ext>
+            </a:extLst>
+          </p:cNvPr>
+          <p:cNvPicPr>
+            <a:picLocks noChangeAspect="1"/>
+          </p:cNvPicPr>
+          <p:nvPr/>
+        </p:nvPicPr>
+        <p:blipFill>
+          <a:blip r:embed="rId2">
+            <a:clrChange>
+              <a:clrFrom>
+                <a:srgbClr val="FFFFFF"/>
+              </a:clrFrom>
+              <a:clrTo>
+                <a:srgbClr val="FFFFFF">
+                  <a:alpha val="0"/>
+                </a:srgbClr>
+              </a:clrTo>
+            </a:clrChange>
+          </a:blip>
+          <a:stretch>
+            <a:fillRect/>
+          </a:stretch>
+        </p:blipFill>
+        <p:spPr>
+          <a:xfrm>
+            <a:off x="10058400" y="49213"/>
+            <a:ext cx="1828519" cy="522434"/>
+          </a:xfrm>
+          <a:prstGeom prst="rect">
+            <a:avLst/>
+          </a:prstGeom>
+        </p:spPr>
+      </p:pic>
+      <p:sp>
+        <p:nvSpPr>
+          <p:cNvPr id="8" name="Subtitle 2">
+            <a:extLst>
+              <a:ext uri="{FF2B5EF4-FFF2-40B4-BE49-F238E27FC236}">
+                <a16:creationId xmlns:a16="http://schemas.microsoft.com/office/drawing/2014/main" id="{35174E85-1326-2F7E-8821-40F5E44C5198}"/>
+              </a:ext>
+            </a:extLst>
+          </p:cNvPr>
+          <p:cNvSpPr txBox="1">
+            <a:spLocks/>
+          </p:cNvSpPr>
+          <p:nvPr/>
+        </p:nvSpPr>
+        <p:spPr>
+          <a:xfrm>
+            <a:off x="614897" y="2846896"/>
+            <a:ext cx="5723150" cy="1847652"/>
+          </a:xfrm>
+          <a:prstGeom prst="rect">
+            <a:avLst/>
+          </a:prstGeom>
+        </p:spPr>
+        <p:txBody>
+          <a:bodyPr vert="horz" lIns="91440" tIns="45720" rIns="91440" bIns="45720" rtlCol="0" anchor="ctr" anchorCtr="0">
+            <a:noAutofit/>
+          </a:bodyPr>
+          <a:lstStyle>
+            <a:lvl1pPr marL="0" indent="0" algn="ctr" defTabSz="914400" rtl="0" eaLnBrk="1" latinLnBrk="0" hangingPunct="1">
+              <a:lnSpc>
+                <a:spcPct val="90000"/>
+              </a:lnSpc>
+              <a:spcBef>
+                <a:spcPts val="1000"/>
+              </a:spcBef>
+              <a:buFont typeface="Arial" panose="020B0604020202020204" pitchFamily="34" charset="0"/>
+              <a:buNone/>
+              <a:defRPr sz="2400" kern="1200">
+                <a:solidFill>
+                  <a:schemeClr val="tx2"/>
+                </a:solidFill>
+                <a:latin typeface="Arial" panose="020B0604020202020204" pitchFamily="34" charset="0"/>
+                <a:ea typeface="+mn-ea"/>
+                <a:cs typeface="Arial" panose="020B0604020202020204" pitchFamily="34" charset="0"/>
+              </a:defRPr>
+            </a:lvl1pPr>
+            <a:lvl2pPr marL="457200" indent="0" algn="ctr" defTabSz="914400" rtl="0" eaLnBrk="1" latinLnBrk="0" hangingPunct="1">
+              <a:lnSpc>
+                <a:spcPct val="90000"/>
+              </a:lnSpc>
+              <a:spcBef>
+                <a:spcPts val="500"/>
+              </a:spcBef>
+              <a:buFont typeface="Arial" panose="020B0604020202020204" pitchFamily="34" charset="0"/>
+              <a:buNone/>
+              <a:defRPr sz="2000" kern="1200">
+                <a:solidFill>
+                  <a:schemeClr val="tx1"/>
+                </a:solidFill>
+                <a:latin typeface="+mn-lt"/>
+                <a:ea typeface="+mn-ea"/>
+                <a:cs typeface="+mn-cs"/>
+              </a:defRPr>
+            </a:lvl2pPr>
+            <a:lvl3pPr marL="914400" indent="0" algn="ctr" defTabSz="914400" rtl="0" eaLnBrk="1" latinLnBrk="0" hangingPunct="1">
+              <a:lnSpc>
+                <a:spcPct val="90000"/>
+              </a:lnSpc>
+              <a:spcBef>
+                <a:spcPts val="500"/>
+              </a:spcBef>
+              <a:buFont typeface="Arial" panose="020B0604020202020204" pitchFamily="34" charset="0"/>
+              <a:buNone/>
+              <a:defRPr sz="1800" kern="1200">
+                <a:solidFill>
+                  <a:schemeClr val="tx1"/>
+                </a:solidFill>
+                <a:latin typeface="+mn-lt"/>
+                <a:ea typeface="+mn-ea"/>
+                <a:cs typeface="+mn-cs"/>
+              </a:defRPr>
+            </a:lvl3pPr>
+            <a:lvl4pPr marL="1371600" indent="0" algn="ctr" defTabSz="914400" rtl="0" eaLnBrk="1" latinLnBrk="0" hangingPunct="1">
+              <a:lnSpc>
+                <a:spcPct val="90000"/>
+              </a:lnSpc>
+              <a:spcBef>
+                <a:spcPts val="500"/>
+              </a:spcBef>
+              <a:buFont typeface="Arial" panose="020B0604020202020204" pitchFamily="34" charset="0"/>
+              <a:buNone/>
+              <a:defRPr sz="1600" kern="1200">
+                <a:solidFill>
+                  <a:schemeClr val="tx1"/>
+                </a:solidFill>
+                <a:latin typeface="+mn-lt"/>
+                <a:ea typeface="+mn-ea"/>
+                <a:cs typeface="+mn-cs"/>
+              </a:defRPr>
+            </a:lvl4pPr>
+            <a:lvl5pPr marL="1828800" indent="0" algn="ctr" defTabSz="914400" rtl="0" eaLnBrk="1" latinLnBrk="0" hangingPunct="1">
+              <a:lnSpc>
+                <a:spcPct val="90000"/>
+              </a:lnSpc>
+              <a:spcBef>
+                <a:spcPts val="500"/>
+              </a:spcBef>
+              <a:buFont typeface="Arial" panose="020B0604020202020204" pitchFamily="34" charset="0"/>
+              <a:buNone/>
+              <a:defRPr sz="1600" kern="1200">
+                <a:solidFill>
+                  <a:schemeClr val="tx1"/>
+                </a:solidFill>
+                <a:latin typeface="+mn-lt"/>
+                <a:ea typeface="+mn-ea"/>
+                <a:cs typeface="+mn-cs"/>
+              </a:defRPr>
+            </a:lvl5pPr>
+            <a:lvl6pPr marL="2286000" indent="0" algn="ctr" defTabSz="914400" rtl="0" eaLnBrk="1" latinLnBrk="0" hangingPunct="1">
+              <a:lnSpc>
+                <a:spcPct val="90000"/>
+              </a:lnSpc>
+              <a:spcBef>
+                <a:spcPts val="500"/>
+              </a:spcBef>
+              <a:buFont typeface="Arial" panose="020B0604020202020204" pitchFamily="34" charset="0"/>
+              <a:buNone/>
+              <a:defRPr sz="1600" kern="1200">
+                <a:solidFill>
+                  <a:schemeClr val="tx1"/>
+                </a:solidFill>
+                <a:latin typeface="+mn-lt"/>
+                <a:ea typeface="+mn-ea"/>
+                <a:cs typeface="+mn-cs"/>
+              </a:defRPr>
+            </a:lvl6pPr>
+            <a:lvl7pPr marL="2743200" indent="0" algn="ctr" defTabSz="914400" rtl="0" eaLnBrk="1" latinLnBrk="0" hangingPunct="1">
+              <a:lnSpc>
+                <a:spcPct val="90000"/>
+              </a:lnSpc>
+              <a:spcBef>
+                <a:spcPts val="500"/>
+              </a:spcBef>
+              <a:buFont typeface="Arial" panose="020B0604020202020204" pitchFamily="34" charset="0"/>
+              <a:buNone/>
+              <a:defRPr sz="1600" kern="1200">
+                <a:solidFill>
+                  <a:schemeClr val="tx1"/>
+                </a:solidFill>
+                <a:latin typeface="+mn-lt"/>
+                <a:ea typeface="+mn-ea"/>
+                <a:cs typeface="+mn-cs"/>
+              </a:defRPr>
+            </a:lvl7pPr>
+            <a:lvl8pPr marL="3200400" indent="0" algn="ctr" defTabSz="914400" rtl="0" eaLnBrk="1" latinLnBrk="0" hangingPunct="1">
+              <a:lnSpc>
+                <a:spcPct val="90000"/>
+              </a:lnSpc>
+              <a:spcBef>
+                <a:spcPts val="500"/>
+              </a:spcBef>
+              <a:buFont typeface="Arial" panose="020B0604020202020204" pitchFamily="34" charset="0"/>
+              <a:buNone/>
+              <a:defRPr sz="1600" kern="1200">
+                <a:solidFill>
+                  <a:schemeClr val="tx1"/>
+                </a:solidFill>
+                <a:latin typeface="+mn-lt"/>
+                <a:ea typeface="+mn-ea"/>
+                <a:cs typeface="+mn-cs"/>
+              </a:defRPr>
+            </a:lvl8pPr>
+            <a:lvl9pPr marL="3657600" indent="0" algn="ctr" defTabSz="914400" rtl="0" eaLnBrk="1" latinLnBrk="0" hangingPunct="1">
+              <a:lnSpc>
+                <a:spcPct val="90000"/>
+              </a:lnSpc>
+              <a:spcBef>
+                <a:spcPts val="500"/>
+              </a:spcBef>
+              <a:buFont typeface="Arial" panose="020B0604020202020204" pitchFamily="34" charset="0"/>
+              <a:buNone/>
+              <a:defRPr sz="1600" kern="1200">
+                <a:solidFill>
+                  <a:schemeClr val="tx1"/>
+                </a:solidFill>
+                <a:latin typeface="+mn-lt"/>
+                <a:ea typeface="+mn-ea"/>
+                <a:cs typeface="+mn-cs"/>
+              </a:defRPr>
+            </a:lvl9pPr>
+          </a:lstStyle>
+          <a:p>
+            <a:pPr algn="l"/>
+            <a:r>
+              <a:rPr lang="en-US" sz="6000" b="1" dirty="0">
+                <a:solidFill>
+                  <a:schemeClr val="tx1">
+                    <a:lumMod val="75000"/>
+                  </a:schemeClr>
+                </a:solidFill>
+              </a:rPr>
+              <a:t>007</a:t>
+            </a:r>
+            <a:r>
+              <a:rPr lang="en-US" sz="3600" b="1" dirty="0">
+                <a:solidFill>
+                  <a:schemeClr val="tx1">
+                    <a:lumMod val="75000"/>
+                  </a:schemeClr>
+                </a:solidFill>
+              </a:rPr>
+              <a:t> – How to get Inferred Result from SPARQL</a:t>
+            </a:r>
+          </a:p>
+        </p:txBody>
+      </p:sp>
+      <p:sp>
+        <p:nvSpPr>
+          <p:cNvPr id="10" name="TextBox 9">
+            <a:extLst>
+              <a:ext uri="{FF2B5EF4-FFF2-40B4-BE49-F238E27FC236}">
+                <a16:creationId xmlns:a16="http://schemas.microsoft.com/office/drawing/2014/main" id="{91CA2F1E-CCA1-C49F-E680-8A9E4515F9C8}"/>
+              </a:ext>
+            </a:extLst>
+          </p:cNvPr>
+          <p:cNvSpPr txBox="1"/>
+          <p:nvPr/>
+        </p:nvSpPr>
+        <p:spPr>
+          <a:xfrm>
+            <a:off x="699247" y="5917021"/>
+            <a:ext cx="9152965" cy="400110"/>
+          </a:xfrm>
+          <a:prstGeom prst="rect">
+            <a:avLst/>
+          </a:prstGeom>
+          <a:noFill/>
+        </p:spPr>
+        <p:txBody>
+          <a:bodyPr wrap="square">
+            <a:spAutoFit/>
+          </a:bodyPr>
+          <a:lstStyle/>
+          <a:p>
+            <a:r>
+              <a:rPr lang="en-US" sz="2000" b="1" dirty="0">
+                <a:latin typeface="Congenial Black" panose="020F0502020204030204" pitchFamily="2" charset="0"/>
+              </a:rPr>
+              <a:t>https://github.com/yasenstar/ontology/tree/main/use_protege</a:t>
+            </a:r>
+          </a:p>
+        </p:txBody>
+      </p:sp>
+      <p:pic>
+        <p:nvPicPr>
+          <p:cNvPr id="6" name="Picture 5">
+            <a:extLst>
+              <a:ext uri="{FF2B5EF4-FFF2-40B4-BE49-F238E27FC236}">
+                <a16:creationId xmlns:a16="http://schemas.microsoft.com/office/drawing/2014/main" id="{B136D125-D930-D3BD-582E-524A66D22FD0}"/>
+              </a:ext>
+            </a:extLst>
+          </p:cNvPr>
+          <p:cNvPicPr>
+            <a:picLocks noChangeAspect="1"/>
+          </p:cNvPicPr>
+          <p:nvPr/>
+        </p:nvPicPr>
+        <p:blipFill>
+          <a:blip r:embed="rId3"/>
+          <a:stretch>
+            <a:fillRect/>
+          </a:stretch>
+        </p:blipFill>
+        <p:spPr>
+          <a:xfrm>
+            <a:off x="5512734" y="2428458"/>
+            <a:ext cx="6141384" cy="3061993"/>
+          </a:xfrm>
+          <a:prstGeom prst="rect">
+            <a:avLst/>
+          </a:prstGeom>
+          <a:ln>
+            <a:noFill/>
+          </a:ln>
+          <a:effectLst>
+            <a:outerShdw blurRad="292100" dist="139700" dir="2700000" algn="tl" rotWithShape="0">
+              <a:srgbClr val="333333">
+                <a:alpha val="65000"/>
+              </a:srgbClr>
+            </a:outerShdw>
+          </a:effectLst>
+        </p:spPr>
+      </p:pic>
+      <p:pic>
+        <p:nvPicPr>
+          <p:cNvPr id="9" name="Picture 8">
+            <a:extLst>
+              <a:ext uri="{FF2B5EF4-FFF2-40B4-BE49-F238E27FC236}">
+                <a16:creationId xmlns:a16="http://schemas.microsoft.com/office/drawing/2014/main" id="{1F04D522-67C4-5B9D-958D-F64836C65DBB}"/>
+              </a:ext>
+            </a:extLst>
+          </p:cNvPr>
+          <p:cNvPicPr>
+            <a:picLocks noChangeAspect="1"/>
+          </p:cNvPicPr>
+          <p:nvPr/>
+        </p:nvPicPr>
+        <p:blipFill>
+          <a:blip r:embed="rId4"/>
+          <a:stretch>
+            <a:fillRect/>
+          </a:stretch>
+        </p:blipFill>
+        <p:spPr>
+          <a:xfrm>
+            <a:off x="134853" y="6317131"/>
+            <a:ext cx="2120630" cy="441606"/>
+          </a:xfrm>
+          <a:prstGeom prst="rect">
+            <a:avLst/>
+          </a:prstGeom>
+          <a:ln>
+            <a:noFill/>
+          </a:ln>
+          <a:effectLst>
+            <a:outerShdw blurRad="292100" dist="139700" dir="2700000" algn="tl" rotWithShape="0">
+              <a:srgbClr val="333333">
+                <a:alpha val="65000"/>
+              </a:srgbClr>
+            </a:outerShdw>
+          </a:effectLst>
+        </p:spPr>
+      </p:pic>
+    </p:spTree>
+    <p:extLst>
+      <p:ext uri="{BB962C8B-B14F-4D97-AF65-F5344CB8AC3E}">
+        <p14:creationId xmlns:p14="http://schemas.microsoft.com/office/powerpoint/2010/main" val="1889508614"/>
+      </p:ext>
+    </p:extLst>
+  </p:cSld>
+  <p:clrMapOvr>
+    <a:masterClrMapping/>
+  </p:clrMapOvr>
+</p:sld>
+</file>
+
+<file path=ppt/slides/slide9.xml><?xml version="1.0" encoding="utf-8"?>
+<p:sld xmlns:a="http://schemas.openxmlformats.org/drawingml/2006/main" xmlns:r="http://schemas.openxmlformats.org/officeDocument/2006/relationships" xmlns:p="http://schemas.openxmlformats.org/presentationml/2006/main">
+  <p:cSld>
+    <p:spTree>
+      <p:nvGrpSpPr>
+        <p:cNvPr id="1" name=""/>
+        <p:cNvGrpSpPr/>
+        <p:nvPr/>
+      </p:nvGrpSpPr>
+      <p:grpSpPr>
+        <a:xfrm>
+          <a:off x="0" y="0"/>
+          <a:ext cx="0" cy="0"/>
+          <a:chOff x="0" y="0"/>
+          <a:chExt cx="0" cy="0"/>
+        </a:xfrm>
+      </p:grpSpPr>
+      <p:sp>
+        <p:nvSpPr>
+          <p:cNvPr id="4" name="Title 3">
+            <a:extLst>
+              <a:ext uri="{FF2B5EF4-FFF2-40B4-BE49-F238E27FC236}">
+                <a16:creationId xmlns:a16="http://schemas.microsoft.com/office/drawing/2014/main" id="{CDDA3825-5986-8244-A502-8079D6C20778}"/>
+              </a:ext>
+            </a:extLst>
+          </p:cNvPr>
+          <p:cNvSpPr>
+            <a:spLocks noGrp="1"/>
+          </p:cNvSpPr>
+          <p:nvPr>
+            <p:ph type="title"/>
+          </p:nvPr>
+        </p:nvSpPr>
+        <p:spPr/>
+        <p:txBody>
+          <a:bodyPr/>
+          <a:lstStyle/>
+          <a:p>
+            <a:r>
+              <a:rPr lang="en-US" dirty="0"/>
+              <a:t>Contents</a:t>
+            </a:r>
+          </a:p>
+        </p:txBody>
+      </p:sp>
+      <p:sp>
+        <p:nvSpPr>
+          <p:cNvPr id="5" name="Content Placeholder 4">
+            <a:extLst>
+              <a:ext uri="{FF2B5EF4-FFF2-40B4-BE49-F238E27FC236}">
+                <a16:creationId xmlns:a16="http://schemas.microsoft.com/office/drawing/2014/main" id="{F65BF483-CB98-9712-E8E0-3F3E10FBB30A}"/>
+              </a:ext>
+            </a:extLst>
+          </p:cNvPr>
+          <p:cNvSpPr>
+            <a:spLocks noGrp="1"/>
+          </p:cNvSpPr>
+          <p:nvPr>
+            <p:ph idx="1"/>
+          </p:nvPr>
+        </p:nvSpPr>
+        <p:spPr/>
+        <p:txBody>
+          <a:bodyPr>
+            <a:normAutofit lnSpcReduction="10000"/>
+          </a:bodyPr>
+          <a:lstStyle/>
+          <a:p>
+            <a:r>
+              <a:rPr lang="en-US" dirty="0"/>
+              <a:t>Problem</a:t>
+            </a:r>
+          </a:p>
+          <a:p>
+            <a:pPr lvl="1"/>
+            <a:r>
+              <a:rPr lang="en-US" dirty="0"/>
+              <a:t>When you have classes / axioms in Ontology (edited in Protégé) which are inferred base on the Reasoner (e.g. Pellet), those contents are not shown in the SPARQL query result</a:t>
+            </a:r>
+          </a:p>
+          <a:p>
+            <a:pPr lvl="1"/>
+            <a:endParaRPr lang="en-US" dirty="0"/>
+          </a:p>
+          <a:p>
+            <a:r>
+              <a:rPr lang="en-US" dirty="0"/>
+              <a:t>Reason</a:t>
+            </a:r>
+          </a:p>
+          <a:p>
+            <a:pPr lvl="1"/>
+            <a:r>
+              <a:rPr lang="en-US" dirty="0"/>
+              <a:t>The inferred contents are not actually in your knowledge base</a:t>
+            </a:r>
+          </a:p>
+          <a:p>
+            <a:pPr lvl="1"/>
+            <a:endParaRPr lang="en-US" dirty="0"/>
+          </a:p>
+          <a:p>
+            <a:r>
+              <a:rPr lang="en-US" dirty="0"/>
+              <a:t>How to make them visible in the SPARQL query?</a:t>
+            </a:r>
+          </a:p>
+          <a:p>
+            <a:pPr lvl="1"/>
+            <a:r>
+              <a:rPr lang="en-US" dirty="0"/>
+              <a:t>3 button steps in </a:t>
+            </a:r>
+            <a:r>
+              <a:rPr lang="en-US" dirty="0" err="1"/>
+              <a:t>SWRLTab</a:t>
+            </a:r>
+            <a:endParaRPr lang="en-US" dirty="0"/>
+          </a:p>
+        </p:txBody>
+      </p:sp>
+    </p:spTree>
+    <p:extLst>
+      <p:ext uri="{BB962C8B-B14F-4D97-AF65-F5344CB8AC3E}">
+        <p14:creationId xmlns:p14="http://schemas.microsoft.com/office/powerpoint/2010/main" val="2198387310"/>
+      </p:ext>
+    </p:extLst>
+  </p:cSld>
+  <p:clrMapOvr>
+    <a:masterClrMapping/>
+  </p:clrMapOvr>
+  <p:timing>
+    <p:tnLst>
+      <p:par>
+        <p:cTn id="1" dur="indefinite" restart="never" nodeType="tmRoot">
+          <p:childTnLst>
+            <p:seq concurrent="1" nextAc="seek">
+              <p:cTn id="2" dur="indefinite" nodeType="mainSeq">
+                <p:childTnLst>
+                  <p:par>
+                    <p:cTn id="3" fill="hold">
+                      <p:stCondLst>
+                        <p:cond delay="indefinite"/>
+                      </p:stCondLst>
+                      <p:childTnLst>
+                        <p:par>
+                          <p:cTn id="4" fill="hold">
+                            <p:stCondLst>
+                              <p:cond delay="0"/>
+                            </p:stCondLst>
+                            <p:childTnLst>
+                              <p:par>
+                                <p:cTn id="5" presetID="10" presetClass="entr" presetSubtype="0" fill="hold" grpId="0" nodeType="clickEffect">
+                                  <p:stCondLst>
+                                    <p:cond delay="0"/>
+                                  </p:stCondLst>
+                                  <p:childTnLst>
+                                    <p:set>
+                                      <p:cBhvr>
+                                        <p:cTn id="6" dur="1" fill="hold">
+                                          <p:stCondLst>
+                                            <p:cond delay="0"/>
+                                          </p:stCondLst>
+                                        </p:cTn>
+                                        <p:tgtEl>
+                                          <p:spTgt spid="5">
+                                            <p:txEl>
+                                              <p:pRg st="0" end="0"/>
+                                            </p:txEl>
+                                          </p:spTgt>
+                                        </p:tgtEl>
+                                        <p:attrNameLst>
+                                          <p:attrName>style.visibility</p:attrName>
+                                        </p:attrNameLst>
+                                      </p:cBhvr>
+                                      <p:to>
+                                        <p:strVal val="visible"/>
+                                      </p:to>
+                                    </p:set>
+                                    <p:animEffect transition="in" filter="fade">
+                                      <p:cBhvr>
+                                        <p:cTn id="7" dur="500"/>
+                                        <p:tgtEl>
+                                          <p:spTgt spid="5">
+                                            <p:txEl>
+                                              <p:pRg st="0" end="0"/>
+                                            </p:txEl>
+                                          </p:spTgt>
+                                        </p:tgtEl>
+                                      </p:cBhvr>
+                                    </p:animEffect>
+                                  </p:childTnLst>
+                                </p:cTn>
+                              </p:par>
+                              <p:par>
+                                <p:cTn id="8" presetID="10" presetClass="entr" presetSubtype="0" fill="hold" grpId="0" nodeType="withEffect">
+                                  <p:stCondLst>
+                                    <p:cond delay="0"/>
+                                  </p:stCondLst>
+                                  <p:childTnLst>
+                                    <p:set>
+                                      <p:cBhvr>
+                                        <p:cTn id="9" dur="1" fill="hold">
+                                          <p:stCondLst>
+                                            <p:cond delay="0"/>
+                                          </p:stCondLst>
+                                        </p:cTn>
+                                        <p:tgtEl>
+                                          <p:spTgt spid="5">
+                                            <p:txEl>
+                                              <p:pRg st="1" end="1"/>
+                                            </p:txEl>
+                                          </p:spTgt>
+                                        </p:tgtEl>
+                                        <p:attrNameLst>
+                                          <p:attrName>style.visibility</p:attrName>
+                                        </p:attrNameLst>
+                                      </p:cBhvr>
+                                      <p:to>
+                                        <p:strVal val="visible"/>
+                                      </p:to>
+                                    </p:set>
+                                    <p:animEffect transition="in" filter="fade">
+                                      <p:cBhvr>
+                                        <p:cTn id="10" dur="500"/>
+                                        <p:tgtEl>
+                                          <p:spTgt spid="5">
+                                            <p:txEl>
+                                              <p:pRg st="1" end="1"/>
+                                            </p:txEl>
+                                          </p:spTgt>
+                                        </p:tgtEl>
+                                      </p:cBhvr>
+                                    </p:animEffect>
+                                  </p:childTnLst>
+                                </p:cTn>
+                              </p:par>
+                            </p:childTnLst>
+                          </p:cTn>
+                        </p:par>
+                      </p:childTnLst>
+                    </p:cTn>
+                  </p:par>
+                  <p:par>
+                    <p:cTn id="11" fill="hold">
+                      <p:stCondLst>
+                        <p:cond delay="indefinite"/>
+                      </p:stCondLst>
+                      <p:childTnLst>
+                        <p:par>
+                          <p:cTn id="12" fill="hold">
+                            <p:stCondLst>
+                              <p:cond delay="0"/>
+                            </p:stCondLst>
+                            <p:childTnLst>
+                              <p:par>
+                                <p:cTn id="13" presetID="10" presetClass="entr" presetSubtype="0" fill="hold" grpId="0" nodeType="clickEffect">
+                                  <p:stCondLst>
+                                    <p:cond delay="0"/>
+                                  </p:stCondLst>
+                                  <p:childTnLst>
+                                    <p:set>
+                                      <p:cBhvr>
+                                        <p:cTn id="14" dur="1" fill="hold">
+                                          <p:stCondLst>
+                                            <p:cond delay="0"/>
+                                          </p:stCondLst>
+                                        </p:cTn>
+                                        <p:tgtEl>
+                                          <p:spTgt spid="5">
+                                            <p:txEl>
+                                              <p:pRg st="3" end="3"/>
+                                            </p:txEl>
+                                          </p:spTgt>
+                                        </p:tgtEl>
+                                        <p:attrNameLst>
+                                          <p:attrName>style.visibility</p:attrName>
+                                        </p:attrNameLst>
+                                      </p:cBhvr>
+                                      <p:to>
+                                        <p:strVal val="visible"/>
+                                      </p:to>
+                                    </p:set>
+                                    <p:animEffect transition="in" filter="fade">
+                                      <p:cBhvr>
+                                        <p:cTn id="15" dur="500"/>
+                                        <p:tgtEl>
+                                          <p:spTgt spid="5">
+                                            <p:txEl>
+                                              <p:pRg st="3" end="3"/>
+                                            </p:txEl>
+                                          </p:spTgt>
+                                        </p:tgtEl>
+                                      </p:cBhvr>
+                                    </p:animEffect>
+                                  </p:childTnLst>
+                                </p:cTn>
+                              </p:par>
+                              <p:par>
+                                <p:cTn id="16" presetID="10" presetClass="entr" presetSubtype="0" fill="hold" grpId="0" nodeType="withEffect">
+                                  <p:stCondLst>
+                                    <p:cond delay="0"/>
+                                  </p:stCondLst>
+                                  <p:childTnLst>
+                                    <p:set>
+                                      <p:cBhvr>
+                                        <p:cTn id="17" dur="1" fill="hold">
+                                          <p:stCondLst>
+                                            <p:cond delay="0"/>
+                                          </p:stCondLst>
+                                        </p:cTn>
+                                        <p:tgtEl>
+                                          <p:spTgt spid="5">
+                                            <p:txEl>
+                                              <p:pRg st="4" end="4"/>
+                                            </p:txEl>
+                                          </p:spTgt>
+                                        </p:tgtEl>
+                                        <p:attrNameLst>
+                                          <p:attrName>style.visibility</p:attrName>
+                                        </p:attrNameLst>
+                                      </p:cBhvr>
+                                      <p:to>
+                                        <p:strVal val="visible"/>
+                                      </p:to>
+                                    </p:set>
+                                    <p:animEffect transition="in" filter="fade">
+                                      <p:cBhvr>
+                                        <p:cTn id="18" dur="500"/>
+                                        <p:tgtEl>
+                                          <p:spTgt spid="5">
+                                            <p:txEl>
+                                              <p:pRg st="4" end="4"/>
+                                            </p:txEl>
+                                          </p:spTgt>
+                                        </p:tgtEl>
+                                      </p:cBhvr>
+                                    </p:animEffect>
+                                  </p:childTnLst>
+                                </p:cTn>
+                              </p:par>
+                            </p:childTnLst>
+                          </p:cTn>
+                        </p:par>
+                      </p:childTnLst>
+                    </p:cTn>
+                  </p:par>
+                  <p:par>
+                    <p:cTn id="19" fill="hold">
+                      <p:stCondLst>
+                        <p:cond delay="indefinite"/>
+                      </p:stCondLst>
+                      <p:childTnLst>
+                        <p:par>
+                          <p:cTn id="20" fill="hold">
+                            <p:stCondLst>
+                              <p:cond delay="0"/>
+                            </p:stCondLst>
+                            <p:childTnLst>
+                              <p:par>
+                                <p:cTn id="21" presetID="10" presetClass="entr" presetSubtype="0" fill="hold" grpId="0" nodeType="clickEffect">
+                                  <p:stCondLst>
+                                    <p:cond delay="0"/>
+                                  </p:stCondLst>
+                                  <p:childTnLst>
+                                    <p:set>
+                                      <p:cBhvr>
+                                        <p:cTn id="22" dur="1" fill="hold">
+                                          <p:stCondLst>
+                                            <p:cond delay="0"/>
+                                          </p:stCondLst>
+                                        </p:cTn>
+                                        <p:tgtEl>
+                                          <p:spTgt spid="5">
+                                            <p:txEl>
+                                              <p:pRg st="6" end="6"/>
+                                            </p:txEl>
+                                          </p:spTgt>
+                                        </p:tgtEl>
+                                        <p:attrNameLst>
+                                          <p:attrName>style.visibility</p:attrName>
+                                        </p:attrNameLst>
+                                      </p:cBhvr>
+                                      <p:to>
+                                        <p:strVal val="visible"/>
+                                      </p:to>
+                                    </p:set>
+                                    <p:animEffect transition="in" filter="fade">
+                                      <p:cBhvr>
+                                        <p:cTn id="23" dur="500"/>
+                                        <p:tgtEl>
+                                          <p:spTgt spid="5">
+                                            <p:txEl>
+                                              <p:pRg st="6" end="6"/>
+                                            </p:txEl>
+                                          </p:spTgt>
+                                        </p:tgtEl>
+                                      </p:cBhvr>
+                                    </p:animEffect>
+                                  </p:childTnLst>
+                                </p:cTn>
+                              </p:par>
+                              <p:par>
+                                <p:cTn id="24" presetID="10" presetClass="entr" presetSubtype="0" fill="hold" grpId="0" nodeType="withEffect">
+                                  <p:stCondLst>
+                                    <p:cond delay="0"/>
+                                  </p:stCondLst>
+                                  <p:childTnLst>
+                                    <p:set>
+                                      <p:cBhvr>
+                                        <p:cTn id="25" dur="1" fill="hold">
+                                          <p:stCondLst>
+                                            <p:cond delay="0"/>
+                                          </p:stCondLst>
+                                        </p:cTn>
+                                        <p:tgtEl>
+                                          <p:spTgt spid="5">
+                                            <p:txEl>
+                                              <p:pRg st="7" end="7"/>
+                                            </p:txEl>
+                                          </p:spTgt>
+                                        </p:tgtEl>
+                                        <p:attrNameLst>
+                                          <p:attrName>style.visibility</p:attrName>
+                                        </p:attrNameLst>
+                                      </p:cBhvr>
+                                      <p:to>
+                                        <p:strVal val="visible"/>
+                                      </p:to>
+                                    </p:set>
+                                    <p:animEffect transition="in" filter="fade">
+                                      <p:cBhvr>
+                                        <p:cTn id="26" dur="500"/>
+                                        <p:tgtEl>
+                                          <p:spTgt spid="5">
+                                            <p:txEl>
+                                              <p:pRg st="7" end="7"/>
+                                            </p:txEl>
+                                          </p:spTgt>
+                                        </p:tgtEl>
+                                      </p:cBhvr>
+                                    </p:animEffect>
+                                  </p:childTnLst>
+                                </p:cTn>
+                              </p:par>
+                            </p:childTnLst>
+                          </p:cTn>
+                        </p:par>
+                      </p:childTnLst>
+                    </p:cTn>
+                  </p:par>
+                </p:childTnLst>
+              </p:cTn>
+              <p:prevCondLst>
+                <p:cond evt="onPrev" delay="0">
+                  <p:tgtEl>
+                    <p:sldTgt/>
+                  </p:tgtEl>
+                </p:cond>
+              </p:prevCondLst>
+              <p:nextCondLst>
+                <p:cond evt="onNext" delay="0">
+                  <p:tgtEl>
+                    <p:sldTgt/>
+                  </p:tgtEl>
+                </p:cond>
+              </p:nextCondLst>
+            </p:seq>
+          </p:childTnLst>
+        </p:cTn>
+      </p:par>
+    </p:tnLst>
+    <p:bldLst>
+      <p:bldP spid="5" grpId="0" build="p"/>
+    </p:bldLst>
+  </p:timing>
+</p:sld>
+</file>
+
 <file path=ppt/theme/theme1.xml><?xml version="1.0" encoding="utf-8"?>
 <a:theme xmlns:a="http://schemas.openxmlformats.org/drawingml/2006/main" name="Office Theme">
   <a:themeElements>
@@ -43703,15 +44901,6 @@
 </file>
 
 <file path=customXml/item1.xml><?xml version="1.0" encoding="utf-8"?>
-<?mso-contentType ?>
-<FormTemplates xmlns="http://schemas.microsoft.com/sharepoint/v3/contenttype/forms">
-  <Display>DocumentLibraryForm</Display>
-  <Edit>DocumentLibraryForm</Edit>
-  <New>DocumentLibraryForm</New>
-</FormTemplates>
-</file>
-
-<file path=customXml/item2.xml><?xml version="1.0" encoding="utf-8"?>
 <ct:contentTypeSchema xmlns:ct="http://schemas.microsoft.com/office/2006/metadata/contentType" xmlns:ma="http://schemas.microsoft.com/office/2006/metadata/properties/metaAttributes" ct:_="" ma:_="" ma:contentTypeName="Document" ma:contentTypeID="0x01010079F111ED35F8CC479449609E8A0923A6" ma:contentTypeVersion="28" ma:contentTypeDescription="Create a new document." ma:contentTypeScope="" ma:versionID="60f5a4f2d2b0abadcf532d48ebf9cb71">
   <xsd:schema xmlns:xsd="http://www.w3.org/2001/XMLSchema" xmlns:xs="http://www.w3.org/2001/XMLSchema" xmlns:p="http://schemas.microsoft.com/office/2006/metadata/properties" xmlns:ns1="http://schemas.microsoft.com/sharepoint/v3" xmlns:ns2="71af3243-3dd4-4a8d-8c0d-dd76da1f02a5" xmlns:ns3="16c05727-aa75-4e4a-9b5f-8a80a1165891" xmlns:ns4="230e9df3-be65-4c73-a93b-d1236ebd677e" targetNamespace="http://schemas.microsoft.com/office/2006/metadata/properties" ma:root="true" ma:fieldsID="7dd78129e6a1811f84807ad11c651531" ns1:_="" ns2:_="" ns3:_="" ns4:_="">
     <xsd:import namespace="http://schemas.microsoft.com/sharepoint/v3"/>
@@ -44023,6 +45212,15 @@
 </ct:contentTypeSchema>
 </file>
 
+<file path=customXml/item2.xml><?xml version="1.0" encoding="utf-8"?>
+<?mso-contentType ?>
+<FormTemplates xmlns="http://schemas.microsoft.com/sharepoint/v3/contenttype/forms">
+  <Display>DocumentLibraryForm</Display>
+  <Edit>DocumentLibraryForm</Edit>
+  <New>DocumentLibraryForm</New>
+</FormTemplates>
+</file>
+
 <file path=customXml/item3.xml><?xml version="1.0" encoding="utf-8"?>
 <p:properties xmlns:p="http://schemas.microsoft.com/office/2006/metadata/properties" xmlns:xsi="http://www.w3.org/2001/XMLSchema-instance" xmlns:pc="http://schemas.microsoft.com/office/infopath/2007/PartnerControls">
   <documentManagement>
@@ -44044,14 +45242,6 @@
 </file>
 
 <file path=customXml/itemProps1.xml><?xml version="1.0" encoding="utf-8"?>
-<ds:datastoreItem xmlns:ds="http://schemas.openxmlformats.org/officeDocument/2006/customXml" ds:itemID="{1EE26AC2-BC04-45BA-BD7C-5CDF09AA9426}">
-  <ds:schemaRefs>
-    <ds:schemaRef ds:uri="http://schemas.microsoft.com/sharepoint/v3/contenttype/forms"/>
-  </ds:schemaRefs>
-</ds:datastoreItem>
-</file>
-
-<file path=customXml/itemProps2.xml><?xml version="1.0" encoding="utf-8"?>
 <ds:datastoreItem xmlns:ds="http://schemas.openxmlformats.org/officeDocument/2006/customXml" ds:itemID="{18840F3C-8AB4-4243-A06A-B5999EF60028}">
   <ds:schemaRefs>
     <ds:schemaRef ds:uri="http://schemas.microsoft.com/office/2006/metadata/contentType"/>
@@ -44072,6 +45262,14 @@
 </ds:datastoreItem>
 </file>
 
+<file path=customXml/itemProps2.xml><?xml version="1.0" encoding="utf-8"?>
+<ds:datastoreItem xmlns:ds="http://schemas.openxmlformats.org/officeDocument/2006/customXml" ds:itemID="{1EE26AC2-BC04-45BA-BD7C-5CDF09AA9426}">
+  <ds:schemaRefs>
+    <ds:schemaRef ds:uri="http://schemas.microsoft.com/sharepoint/v3/contenttype/forms"/>
+  </ds:schemaRefs>
+</ds:datastoreItem>
+</file>
+
 <file path=customXml/itemProps3.xml><?xml version="1.0" encoding="utf-8"?>
 <ds:datastoreItem xmlns:ds="http://schemas.openxmlformats.org/officeDocument/2006/customXml" ds:itemID="{C7AE7813-FB42-416C-BEF8-5F3180DDB0F6}">
   <ds:schemaRefs>

</xml_diff>

<commit_message>
add "ontology view for LeanIX meta model"
</commit_message>
<xml_diff>
--- a/use_protege/Using_Protege.pptx
+++ b/use_protege/Using_Protege.pptx
@@ -261,7 +261,7 @@
           <a:p>
             <a:fld id="{FD913024-4032-4B4F-8680-09D5E08EDB6E}" type="datetimeFigureOut">
               <a:rPr lang="en-US" smtClean="0"/>
-              <a:t>9/17/2024</a:t>
+              <a:t>9/18/2024</a:t>
             </a:fld>
             <a:endParaRPr lang="en-US" dirty="0"/>
           </a:p>
@@ -438,7 +438,7 @@
           <a:p>
             <a:fld id="{F2AE225E-43E0-7047-8ADB-DD9EBB41B4D0}" type="datetimeFigureOut">
               <a:rPr lang="en-US" noProof="0" smtClean="0"/>
-              <a:t>9/17/2024</a:t>
+              <a:t>9/18/2024</a:t>
             </a:fld>
             <a:endParaRPr lang="en-US" noProof="0" dirty="0"/>
           </a:p>
@@ -40860,15 +40860,17 @@
           <p:nvPr/>
         </p:nvPicPr>
         <p:blipFill>
-          <a:blip r:embed="rId4"/>
+          <a:blip r:embed="rId4">
+            <a:alphaModFix amt="85000"/>
+          </a:blip>
           <a:stretch>
             <a:fillRect/>
           </a:stretch>
         </p:blipFill>
         <p:spPr>
           <a:xfrm>
-            <a:off x="306614" y="640744"/>
-            <a:ext cx="2074889" cy="2347901"/>
+            <a:off x="2846022" y="639887"/>
+            <a:ext cx="3404410" cy="3852359"/>
           </a:xfrm>
           <a:prstGeom prst="rect">
             <a:avLst/>
@@ -44911,15 +44913,6 @@
 </file>
 
 <file path=customXml/item1.xml><?xml version="1.0" encoding="utf-8"?>
-<?mso-contentType ?>
-<FormTemplates xmlns="http://schemas.microsoft.com/sharepoint/v3/contenttype/forms">
-  <Display>DocumentLibraryForm</Display>
-  <Edit>DocumentLibraryForm</Edit>
-  <New>DocumentLibraryForm</New>
-</FormTemplates>
-</file>
-
-<file path=customXml/item2.xml><?xml version="1.0" encoding="utf-8"?>
 <ct:contentTypeSchema xmlns:ct="http://schemas.microsoft.com/office/2006/metadata/contentType" xmlns:ma="http://schemas.microsoft.com/office/2006/metadata/properties/metaAttributes" ct:_="" ma:_="" ma:contentTypeName="Document" ma:contentTypeID="0x01010079F111ED35F8CC479449609E8A0923A6" ma:contentTypeVersion="28" ma:contentTypeDescription="Create a new document." ma:contentTypeScope="" ma:versionID="60f5a4f2d2b0abadcf532d48ebf9cb71">
   <xsd:schema xmlns:xsd="http://www.w3.org/2001/XMLSchema" xmlns:xs="http://www.w3.org/2001/XMLSchema" xmlns:p="http://schemas.microsoft.com/office/2006/metadata/properties" xmlns:ns1="http://schemas.microsoft.com/sharepoint/v3" xmlns:ns2="71af3243-3dd4-4a8d-8c0d-dd76da1f02a5" xmlns:ns3="16c05727-aa75-4e4a-9b5f-8a80a1165891" xmlns:ns4="230e9df3-be65-4c73-a93b-d1236ebd677e" targetNamespace="http://schemas.microsoft.com/office/2006/metadata/properties" ma:root="true" ma:fieldsID="7dd78129e6a1811f84807ad11c651531" ns1:_="" ns2:_="" ns3:_="" ns4:_="">
     <xsd:import namespace="http://schemas.microsoft.com/sharepoint/v3"/>
@@ -45231,6 +45224,15 @@
 </ct:contentTypeSchema>
 </file>
 
+<file path=customXml/item2.xml><?xml version="1.0" encoding="utf-8"?>
+<?mso-contentType ?>
+<FormTemplates xmlns="http://schemas.microsoft.com/sharepoint/v3/contenttype/forms">
+  <Display>DocumentLibraryForm</Display>
+  <Edit>DocumentLibraryForm</Edit>
+  <New>DocumentLibraryForm</New>
+</FormTemplates>
+</file>
+
 <file path=customXml/item3.xml><?xml version="1.0" encoding="utf-8"?>
 <p:properties xmlns:p="http://schemas.microsoft.com/office/2006/metadata/properties" xmlns:xsi="http://www.w3.org/2001/XMLSchema-instance" xmlns:pc="http://schemas.microsoft.com/office/infopath/2007/PartnerControls">
   <documentManagement>
@@ -45252,14 +45254,6 @@
 </file>
 
 <file path=customXml/itemProps1.xml><?xml version="1.0" encoding="utf-8"?>
-<ds:datastoreItem xmlns:ds="http://schemas.openxmlformats.org/officeDocument/2006/customXml" ds:itemID="{1EE26AC2-BC04-45BA-BD7C-5CDF09AA9426}">
-  <ds:schemaRefs>
-    <ds:schemaRef ds:uri="http://schemas.microsoft.com/sharepoint/v3/contenttype/forms"/>
-  </ds:schemaRefs>
-</ds:datastoreItem>
-</file>
-
-<file path=customXml/itemProps2.xml><?xml version="1.0" encoding="utf-8"?>
 <ds:datastoreItem xmlns:ds="http://schemas.openxmlformats.org/officeDocument/2006/customXml" ds:itemID="{18840F3C-8AB4-4243-A06A-B5999EF60028}">
   <ds:schemaRefs>
     <ds:schemaRef ds:uri="http://schemas.microsoft.com/office/2006/metadata/contentType"/>
@@ -45280,6 +45274,14 @@
 </ds:datastoreItem>
 </file>
 
+<file path=customXml/itemProps2.xml><?xml version="1.0" encoding="utf-8"?>
+<ds:datastoreItem xmlns:ds="http://schemas.openxmlformats.org/officeDocument/2006/customXml" ds:itemID="{1EE26AC2-BC04-45BA-BD7C-5CDF09AA9426}">
+  <ds:schemaRefs>
+    <ds:schemaRef ds:uri="http://schemas.microsoft.com/sharepoint/v3/contenttype/forms"/>
+  </ds:schemaRefs>
+</ds:datastoreItem>
+</file>
+
 <file path=customXml/itemProps3.xml><?xml version="1.0" encoding="utf-8"?>
 <ds:datastoreItem xmlns:ds="http://schemas.openxmlformats.org/officeDocument/2006/customXml" ds:itemID="{C7AE7813-FB42-416C-BEF8-5F3180DDB0F6}">
   <ds:schemaRefs>

</xml_diff>